<commit_message>
Updated figures, added introduction and problem definition
</commit_message>
<xml_diff>
--- a/Presentation/Prezentácia_MS_Library.pptx
+++ b/Presentation/Prezentácia_MS_Library.pptx
@@ -9,8 +9,8 @@
   </p:notesMasterIdLst>
   <p:sldIdLst>
     <p:sldId id="256" r:id="rId2"/>
-    <p:sldId id="257" r:id="rId3"/>
-    <p:sldId id="258" r:id="rId4"/>
+    <p:sldId id="258" r:id="rId3"/>
+    <p:sldId id="278" r:id="rId4"/>
     <p:sldId id="259" r:id="rId5"/>
     <p:sldId id="261" r:id="rId6"/>
     <p:sldId id="262" r:id="rId7"/>
@@ -126,6 +126,11 @@
       </a:defRPr>
     </a:lvl9pPr>
   </p:defaultTextStyle>
+  <p:extLst>
+    <p:ext uri="{EFAFB233-063F-42B5-8137-9DF3F51BA10A}">
+      <p15:sldGuideLst xmlns:p15="http://schemas.microsoft.com/office/powerpoint/2012/main"/>
+    </p:ext>
+  </p:extLst>
 </p:presentation>
 </file>
 
@@ -3649,8 +3654,8 @@
         </p:blipFill>
         <p:spPr>
           <a:xfrm>
-            <a:off x="6426987" y="3050646"/>
-            <a:ext cx="4517721" cy="3011813"/>
+            <a:off x="6426988" y="3050646"/>
+            <a:ext cx="4517719" cy="3011813"/>
           </a:xfrm>
           <a:prstGeom prst="rect">
             <a:avLst/>
@@ -3684,8 +3689,8 @@
         </p:blipFill>
         <p:spPr>
           <a:xfrm>
-            <a:off x="1247293" y="3050643"/>
-            <a:ext cx="4517721" cy="3011813"/>
+            <a:off x="1247294" y="3050643"/>
+            <a:ext cx="4517719" cy="3011813"/>
           </a:xfrm>
           <a:prstGeom prst="rect">
             <a:avLst/>
@@ -3979,8 +3984,8 @@
         </p:blipFill>
         <p:spPr>
           <a:xfrm>
-            <a:off x="6426987" y="3050646"/>
-            <a:ext cx="4517721" cy="3011813"/>
+            <a:off x="6426988" y="3050646"/>
+            <a:ext cx="4517719" cy="3011813"/>
           </a:xfrm>
           <a:prstGeom prst="rect">
             <a:avLst/>
@@ -4014,8 +4019,8 @@
         </p:blipFill>
         <p:spPr>
           <a:xfrm>
-            <a:off x="1247293" y="3050643"/>
-            <a:ext cx="4517721" cy="3011813"/>
+            <a:off x="1247294" y="3050643"/>
+            <a:ext cx="4517719" cy="3011813"/>
           </a:xfrm>
           <a:prstGeom prst="rect">
             <a:avLst/>
@@ -5492,6 +5497,10 @@
           <a:bodyPr/>
           <a:lstStyle/>
           <a:p>
+            <a:r>
+              <a:rPr lang="sk-SK" dirty="0" err="1"/>
+              <a:t>load</a:t>
+            </a:r>
             <a:endParaRPr lang="en-GB" dirty="0"/>
           </a:p>
         </p:txBody>
@@ -5938,6 +5947,10 @@
           <a:bodyPr/>
           <a:lstStyle/>
           <a:p>
+            <a:r>
+              <a:rPr lang="sk-SK" dirty="0" err="1"/>
+              <a:t>load</a:t>
+            </a:r>
             <a:endParaRPr lang="en-GB" dirty="0"/>
           </a:p>
         </p:txBody>
@@ -6392,6 +6405,10 @@
           <a:bodyPr/>
           <a:lstStyle/>
           <a:p>
+            <a:r>
+              <a:rPr lang="sk-SK" dirty="0" err="1"/>
+              <a:t>load</a:t>
+            </a:r>
             <a:endParaRPr lang="en-GB" dirty="0"/>
           </a:p>
         </p:txBody>
@@ -6839,6 +6856,10 @@
           <a:bodyPr/>
           <a:lstStyle/>
           <a:p>
+            <a:r>
+              <a:rPr lang="sk-SK" dirty="0" err="1"/>
+              <a:t>load</a:t>
+            </a:r>
             <a:endParaRPr lang="en-GB" dirty="0"/>
           </a:p>
         </p:txBody>
@@ -7489,14 +7510,13 @@
               </a:ext>
             </a:extLst>
           </a:blip>
-          <a:stretch>
-            <a:fillRect/>
-          </a:stretch>
+          <a:srcRect/>
+          <a:stretch/>
         </p:blipFill>
         <p:spPr>
           <a:xfrm>
             <a:off x="6426987" y="3050646"/>
-            <a:ext cx="4517721" cy="3011814"/>
+            <a:ext cx="4517721" cy="3011813"/>
           </a:xfrm>
           <a:prstGeom prst="rect">
             <a:avLst/>
@@ -7525,14 +7545,13 @@
               </a:ext>
             </a:extLst>
           </a:blip>
-          <a:stretch>
-            <a:fillRect/>
-          </a:stretch>
+          <a:srcRect/>
+          <a:stretch/>
         </p:blipFill>
         <p:spPr>
           <a:xfrm>
             <a:off x="1247293" y="3050643"/>
-            <a:ext cx="4517721" cy="3011814"/>
+            <a:ext cx="4517721" cy="3011813"/>
           </a:xfrm>
           <a:prstGeom prst="rect">
             <a:avLst/>
@@ -7791,8 +7810,8 @@
         </p:blipFill>
         <p:spPr>
           <a:xfrm>
-            <a:off x="6426987" y="3050646"/>
-            <a:ext cx="4517721" cy="3011813"/>
+            <a:off x="6426988" y="3050646"/>
+            <a:ext cx="4517719" cy="3011813"/>
           </a:xfrm>
           <a:prstGeom prst="rect">
             <a:avLst/>
@@ -7826,8 +7845,8 @@
         </p:blipFill>
         <p:spPr>
           <a:xfrm>
-            <a:off x="1247293" y="3050643"/>
-            <a:ext cx="4517721" cy="3011813"/>
+            <a:off x="1247294" y="3050643"/>
+            <a:ext cx="4517719" cy="3011813"/>
           </a:xfrm>
           <a:prstGeom prst="rect">
             <a:avLst/>
@@ -8119,7 +8138,7 @@
         <p:spPr>
           <a:xfrm>
             <a:off x="6426988" y="3050646"/>
-            <a:ext cx="4517719" cy="3011813"/>
+            <a:ext cx="4517719" cy="3011812"/>
           </a:xfrm>
           <a:prstGeom prst="rect">
             <a:avLst/>
@@ -8154,7 +8173,7 @@
         <p:spPr>
           <a:xfrm>
             <a:off x="1247294" y="3050643"/>
-            <a:ext cx="4517719" cy="3011813"/>
+            <a:ext cx="4517719" cy="3011812"/>
           </a:xfrm>
           <a:prstGeom prst="rect">
             <a:avLst/>
@@ -8196,7 +8215,7 @@
           <p:cNvPr id="2" name="Zástupný objekt pre obsah 1">
             <a:extLst>
               <a:ext uri="{FF2B5EF4-FFF2-40B4-BE49-F238E27FC236}">
-                <a16:creationId xmlns:a16="http://schemas.microsoft.com/office/drawing/2014/main" id="{BCC770C5-83FC-35D8-71DE-4668A017DAD4}"/>
+                <a16:creationId xmlns:a16="http://schemas.microsoft.com/office/drawing/2014/main" id="{DE78364A-46D4-A621-A891-0EC1C1D6D6BA}"/>
               </a:ext>
             </a:extLst>
           </p:cNvPr>
@@ -8216,16 +8235,237 @@
               <a:buFont typeface="Arial" panose="020B0604020202020204" pitchFamily="34" charset="0"/>
               <a:buChar char="•"/>
             </a:pPr>
+            <a:r>
+              <a:rPr lang="sk-SK" dirty="0"/>
+              <a:t> </a:t>
+            </a:r>
+            <a:r>
+              <a:rPr lang="sk-SK" dirty="0" err="1"/>
+              <a:t>Mass</a:t>
+            </a:r>
+            <a:r>
+              <a:rPr lang="sk-SK" dirty="0"/>
+              <a:t> </a:t>
+            </a:r>
+            <a:r>
+              <a:rPr lang="sk-SK" dirty="0" err="1"/>
+              <a:t>spectrometry</a:t>
+            </a:r>
+            <a:r>
+              <a:rPr lang="sk-SK" dirty="0"/>
+              <a:t>:</a:t>
+            </a:r>
+          </a:p>
+          <a:p>
+            <a:pPr lvl="1">
+              <a:buFont typeface="Arial" panose="020B0604020202020204" pitchFamily="34" charset="0"/>
+              <a:buChar char="•"/>
+            </a:pPr>
+            <a:r>
+              <a:rPr lang="sk-SK" dirty="0" err="1"/>
+              <a:t>Analytical</a:t>
+            </a:r>
+            <a:r>
+              <a:rPr lang="sk-SK" dirty="0"/>
+              <a:t> </a:t>
+            </a:r>
+            <a:r>
+              <a:rPr lang="sk-SK" dirty="0" err="1"/>
+              <a:t>method</a:t>
+            </a:r>
             <a:endParaRPr lang="sk-SK" dirty="0"/>
           </a:p>
-        </p:txBody>
-      </p:sp>
-      <p:sp>
-        <p:nvSpPr>
-          <p:cNvPr id="3" name="Nadpis 2">
+          <a:p>
+            <a:pPr lvl="1">
+              <a:buFont typeface="Arial" panose="020B0604020202020204" pitchFamily="34" charset="0"/>
+              <a:buChar char="•"/>
+            </a:pPr>
+            <a:r>
+              <a:rPr lang="sk-SK" dirty="0" err="1"/>
+              <a:t>Unrivaled</a:t>
+            </a:r>
+            <a:r>
+              <a:rPr lang="sk-SK" dirty="0"/>
+              <a:t> </a:t>
+            </a:r>
+            <a:r>
+              <a:rPr lang="sk-SK" dirty="0" err="1"/>
+              <a:t>sensitivity</a:t>
+            </a:r>
+            <a:endParaRPr lang="sk-SK" dirty="0"/>
+          </a:p>
+          <a:p>
+            <a:pPr lvl="1">
+              <a:buFont typeface="Arial" panose="020B0604020202020204" pitchFamily="34" charset="0"/>
+              <a:buChar char="•"/>
+            </a:pPr>
+            <a:r>
+              <a:rPr lang="sk-SK" dirty="0" err="1"/>
+              <a:t>Low</a:t>
+            </a:r>
+            <a:r>
+              <a:rPr lang="sk-SK" dirty="0"/>
+              <a:t> </a:t>
+            </a:r>
+            <a:r>
+              <a:rPr lang="sk-SK" dirty="0" err="1"/>
+              <a:t>detection</a:t>
+            </a:r>
+            <a:r>
+              <a:rPr lang="sk-SK" dirty="0"/>
+              <a:t> </a:t>
+            </a:r>
+            <a:r>
+              <a:rPr lang="sk-SK" dirty="0" err="1"/>
+              <a:t>limits</a:t>
+            </a:r>
+            <a:endParaRPr lang="sk-SK" dirty="0"/>
+          </a:p>
+          <a:p>
+            <a:pPr lvl="1">
+              <a:buFont typeface="Arial" panose="020B0604020202020204" pitchFamily="34" charset="0"/>
+              <a:buChar char="•"/>
+            </a:pPr>
+            <a:r>
+              <a:rPr lang="sk-SK" dirty="0" err="1"/>
+              <a:t>Huge</a:t>
+            </a:r>
+            <a:r>
+              <a:rPr lang="sk-SK" dirty="0"/>
+              <a:t> </a:t>
+            </a:r>
+            <a:r>
+              <a:rPr lang="sk-SK" dirty="0" err="1"/>
+              <a:t>amount</a:t>
+            </a:r>
+            <a:r>
+              <a:rPr lang="sk-SK" dirty="0"/>
+              <a:t> of </a:t>
+            </a:r>
+            <a:r>
+              <a:rPr lang="sk-SK" dirty="0" err="1"/>
+              <a:t>data</a:t>
+            </a:r>
+            <a:endParaRPr lang="sk-SK" dirty="0"/>
+          </a:p>
+          <a:p>
+            <a:pPr>
+              <a:buFont typeface="Arial" panose="020B0604020202020204" pitchFamily="34" charset="0"/>
+              <a:buChar char="•"/>
+            </a:pPr>
+            <a:r>
+              <a:rPr lang="sk-SK" dirty="0"/>
+              <a:t> </a:t>
+            </a:r>
+            <a:r>
+              <a:rPr lang="sk-SK" dirty="0" err="1"/>
+              <a:t>Synthetic</a:t>
+            </a:r>
+            <a:r>
+              <a:rPr lang="sk-SK" dirty="0"/>
+              <a:t> </a:t>
+            </a:r>
+            <a:r>
+              <a:rPr lang="sk-SK" dirty="0" err="1"/>
+              <a:t>spectral</a:t>
+            </a:r>
+            <a:r>
+              <a:rPr lang="sk-SK" dirty="0"/>
+              <a:t> </a:t>
+            </a:r>
+            <a:r>
+              <a:rPr lang="sk-SK" dirty="0" err="1"/>
+              <a:t>libraries</a:t>
+            </a:r>
+            <a:r>
+              <a:rPr lang="sk-SK" dirty="0"/>
+              <a:t>:</a:t>
+            </a:r>
+          </a:p>
+          <a:p>
+            <a:pPr lvl="1">
+              <a:buFont typeface="Arial" panose="020B0604020202020204" pitchFamily="34" charset="0"/>
+              <a:buChar char="•"/>
+            </a:pPr>
+            <a:r>
+              <a:rPr lang="sk-SK" dirty="0" err="1"/>
+              <a:t>Cover</a:t>
+            </a:r>
+            <a:r>
+              <a:rPr lang="sk-SK" dirty="0"/>
+              <a:t> </a:t>
+            </a:r>
+            <a:r>
+              <a:rPr lang="sk-SK" dirty="0" err="1"/>
+              <a:t>blank</a:t>
+            </a:r>
+            <a:r>
+              <a:rPr lang="sk-SK" dirty="0"/>
+              <a:t> </a:t>
+            </a:r>
+            <a:r>
+              <a:rPr lang="sk-SK" dirty="0" err="1"/>
+              <a:t>spaces</a:t>
+            </a:r>
+            <a:r>
+              <a:rPr lang="sk-SK" dirty="0"/>
+              <a:t> in </a:t>
+            </a:r>
+            <a:r>
+              <a:rPr lang="sk-SK" dirty="0" err="1"/>
+              <a:t>database</a:t>
+            </a:r>
+            <a:endParaRPr lang="sk-SK" dirty="0"/>
+          </a:p>
+          <a:p>
+            <a:pPr lvl="1">
+              <a:buFont typeface="Arial" panose="020B0604020202020204" pitchFamily="34" charset="0"/>
+              <a:buChar char="•"/>
+            </a:pPr>
+            <a:r>
+              <a:rPr lang="sk-SK" dirty="0" err="1"/>
+              <a:t>Better</a:t>
+            </a:r>
+            <a:r>
+              <a:rPr lang="sk-SK" dirty="0"/>
+              <a:t> </a:t>
+            </a:r>
+            <a:r>
+              <a:rPr lang="sk-SK" dirty="0" err="1"/>
+              <a:t>availability</a:t>
+            </a:r>
+            <a:r>
+              <a:rPr lang="sk-SK" dirty="0"/>
+              <a:t> and </a:t>
+            </a:r>
+            <a:r>
+              <a:rPr lang="sk-SK" dirty="0" err="1"/>
+              <a:t>retreivability</a:t>
+            </a:r>
+            <a:r>
+              <a:rPr lang="sk-SK" dirty="0"/>
+              <a:t> of </a:t>
+            </a:r>
+            <a:r>
+              <a:rPr lang="sk-SK" dirty="0" err="1"/>
+              <a:t>compounds</a:t>
+            </a:r>
+            <a:endParaRPr lang="sk-SK" dirty="0"/>
+          </a:p>
+          <a:p>
+            <a:pPr marL="201168" lvl="1" indent="0">
+              <a:buNone/>
+            </a:pPr>
+            <a:endParaRPr lang="sk-SK" dirty="0"/>
+          </a:p>
+        </p:txBody>
+      </p:sp>
+      <p:sp>
+        <p:nvSpPr>
+          <p:cNvPr id="3" name="Zástupný objekt pre pätu 2">
             <a:extLst>
               <a:ext uri="{FF2B5EF4-FFF2-40B4-BE49-F238E27FC236}">
-                <a16:creationId xmlns:a16="http://schemas.microsoft.com/office/drawing/2014/main" id="{C631083B-1EF5-68CD-E5EE-B992B94FEF75}"/>
+                <a16:creationId xmlns:a16="http://schemas.microsoft.com/office/drawing/2014/main" id="{251DC6B9-A2BB-E997-C802-31820B4CA018}"/>
               </a:ext>
             </a:extLst>
           </p:cNvPr>
@@ -8233,7 +8473,7 @@
             <a:spLocks noGrp="1"/>
           </p:cNvSpPr>
           <p:nvPr>
-            <p:ph type="title"/>
+            <p:ph type="ftr" sz="quarter" idx="11"/>
           </p:nvPr>
         </p:nvSpPr>
         <p:spPr/>
@@ -8243,7 +8483,15 @@
           <a:p>
             <a:r>
               <a:rPr lang="sk-SK" dirty="0" err="1"/>
-              <a:t>Introduction</a:t>
+              <a:t>Problem</a:t>
+            </a:r>
+            <a:r>
+              <a:rPr lang="sk-SK" dirty="0"/>
+              <a:t> </a:t>
+            </a:r>
+            <a:r>
+              <a:rPr lang="sk-SK" dirty="0" err="1"/>
+              <a:t>statement</a:t>
             </a:r>
             <a:endParaRPr lang="en-GB" dirty="0"/>
           </a:p>
@@ -8251,39 +8499,10 @@
       </p:sp>
       <p:sp>
         <p:nvSpPr>
-          <p:cNvPr id="4" name="Zástupný objekt pre pätu 3">
+          <p:cNvPr id="4" name="Zástupný objekt pre číslo snímky 3">
             <a:extLst>
               <a:ext uri="{FF2B5EF4-FFF2-40B4-BE49-F238E27FC236}">
-                <a16:creationId xmlns:a16="http://schemas.microsoft.com/office/drawing/2014/main" id="{41B245F9-BB79-EE9B-1A5C-D98CC28D997D}"/>
-              </a:ext>
-            </a:extLst>
-          </p:cNvPr>
-          <p:cNvSpPr>
-            <a:spLocks noGrp="1"/>
-          </p:cNvSpPr>
-          <p:nvPr>
-            <p:ph type="ftr" sz="quarter" idx="11"/>
-          </p:nvPr>
-        </p:nvSpPr>
-        <p:spPr/>
-        <p:txBody>
-          <a:bodyPr/>
-          <a:lstStyle/>
-          <a:p>
-            <a:r>
-              <a:rPr lang="sk-SK" dirty="0" err="1"/>
-              <a:t>Introduction</a:t>
-            </a:r>
-            <a:endParaRPr lang="en-GB" dirty="0"/>
-          </a:p>
-        </p:txBody>
-      </p:sp>
-      <p:sp>
-        <p:nvSpPr>
-          <p:cNvPr id="5" name="Zástupný objekt pre číslo snímky 4">
-            <a:extLst>
-              <a:ext uri="{FF2B5EF4-FFF2-40B4-BE49-F238E27FC236}">
-                <a16:creationId xmlns:a16="http://schemas.microsoft.com/office/drawing/2014/main" id="{A5DA0719-C448-76C7-3F88-C4928077BFD6}"/>
+                <a16:creationId xmlns:a16="http://schemas.microsoft.com/office/drawing/2014/main" id="{2D9A30C1-C1BB-4B59-F673-1381E37D3280}"/>
               </a:ext>
             </a:extLst>
           </p:cNvPr>
@@ -8307,10 +8526,47 @@
           </a:p>
         </p:txBody>
       </p:sp>
+      <p:sp>
+        <p:nvSpPr>
+          <p:cNvPr id="5" name="Nadpis 4">
+            <a:extLst>
+              <a:ext uri="{FF2B5EF4-FFF2-40B4-BE49-F238E27FC236}">
+                <a16:creationId xmlns:a16="http://schemas.microsoft.com/office/drawing/2014/main" id="{F90EB113-D645-BBDA-CE82-6BBA2163B89A}"/>
+              </a:ext>
+            </a:extLst>
+          </p:cNvPr>
+          <p:cNvSpPr>
+            <a:spLocks noGrp="1"/>
+          </p:cNvSpPr>
+          <p:nvPr>
+            <p:ph type="title"/>
+          </p:nvPr>
+        </p:nvSpPr>
+        <p:spPr/>
+        <p:txBody>
+          <a:bodyPr/>
+          <a:lstStyle/>
+          <a:p>
+            <a:r>
+              <a:rPr lang="sk-SK" dirty="0" err="1"/>
+              <a:t>Problem</a:t>
+            </a:r>
+            <a:r>
+              <a:rPr lang="sk-SK" dirty="0"/>
+              <a:t> </a:t>
+            </a:r>
+            <a:r>
+              <a:rPr lang="sk-SK" dirty="0" err="1"/>
+              <a:t>Definition</a:t>
+            </a:r>
+            <a:endParaRPr lang="en-GB" dirty="0"/>
+          </a:p>
+        </p:txBody>
+      </p:sp>
     </p:spTree>
     <p:extLst>
       <p:ext uri="{BB962C8B-B14F-4D97-AF65-F5344CB8AC3E}">
-        <p14:creationId xmlns:p14="http://schemas.microsoft.com/office/powerpoint/2010/main" val="177675697"/>
+        <p14:creationId xmlns:p14="http://schemas.microsoft.com/office/powerpoint/2010/main" val="474628617"/>
       </p:ext>
     </p:extLst>
   </p:cSld>
@@ -8539,10 +8795,10 @@
       </p:sp>
       <p:pic>
         <p:nvPicPr>
-          <p:cNvPr id="10" name="Obrázok 9">
+          <p:cNvPr id="7" name="Obrázok 6">
             <a:extLst>
               <a:ext uri="{FF2B5EF4-FFF2-40B4-BE49-F238E27FC236}">
-                <a16:creationId xmlns:a16="http://schemas.microsoft.com/office/drawing/2014/main" id="{F91996DF-B4E8-23B6-5DF5-6D3740174486}"/>
+                <a16:creationId xmlns:a16="http://schemas.microsoft.com/office/drawing/2014/main" id="{59CF8A6D-E2ED-2232-2081-EC9E2E95C320}"/>
               </a:ext>
             </a:extLst>
           </p:cNvPr>
@@ -8564,8 +8820,8 @@
         </p:blipFill>
         <p:spPr>
           <a:xfrm>
-            <a:off x="6545464" y="3050646"/>
-            <a:ext cx="4261716" cy="3011813"/>
+            <a:off x="6426988" y="3050646"/>
+            <a:ext cx="4517718" cy="3011812"/>
           </a:xfrm>
           <a:prstGeom prst="rect">
             <a:avLst/>
@@ -8574,10 +8830,10 @@
       </p:pic>
       <p:pic>
         <p:nvPicPr>
-          <p:cNvPr id="11" name="Obrázok 10">
+          <p:cNvPr id="8" name="Obrázok 7">
             <a:extLst>
               <a:ext uri="{FF2B5EF4-FFF2-40B4-BE49-F238E27FC236}">
-                <a16:creationId xmlns:a16="http://schemas.microsoft.com/office/drawing/2014/main" id="{F4C87833-9B3D-1FF7-EBE6-A474CA1115B2}"/>
+                <a16:creationId xmlns:a16="http://schemas.microsoft.com/office/drawing/2014/main" id="{DC47831B-E51B-F99A-7A54-AA8BC2115E05}"/>
               </a:ext>
             </a:extLst>
           </p:cNvPr>
@@ -8599,8 +8855,8 @@
         </p:blipFill>
         <p:spPr>
           <a:xfrm>
-            <a:off x="1298005" y="3050643"/>
-            <a:ext cx="4397247" cy="3011813"/>
+            <a:off x="1247294" y="3050643"/>
+            <a:ext cx="4517718" cy="3011812"/>
           </a:xfrm>
           <a:prstGeom prst="rect">
             <a:avLst/>
@@ -8642,7 +8898,7 @@
           <p:cNvPr id="2" name="Zástupný objekt pre obsah 1">
             <a:extLst>
               <a:ext uri="{FF2B5EF4-FFF2-40B4-BE49-F238E27FC236}">
-                <a16:creationId xmlns:a16="http://schemas.microsoft.com/office/drawing/2014/main" id="{DE78364A-46D4-A621-A891-0EC1C1D6D6BA}"/>
+                <a16:creationId xmlns:a16="http://schemas.microsoft.com/office/drawing/2014/main" id="{D82FE69A-4391-8852-3B5D-1B068D9F7A2E}"/>
               </a:ext>
             </a:extLst>
           </p:cNvPr>
@@ -8658,7 +8914,180 @@
           <a:bodyPr/>
           <a:lstStyle/>
           <a:p>
-            <a:endParaRPr lang="en-GB"/>
+            <a:pPr>
+              <a:buFont typeface="Arial" panose="020B0604020202020204" pitchFamily="34" charset="0"/>
+              <a:buChar char="•"/>
+            </a:pPr>
+            <a:r>
+              <a:rPr lang="sk-SK" dirty="0"/>
+              <a:t> </a:t>
+            </a:r>
+            <a:r>
+              <a:rPr lang="sk-SK" dirty="0" err="1"/>
+              <a:t>Load</a:t>
+            </a:r>
+            <a:r>
+              <a:rPr lang="sk-SK" dirty="0"/>
+              <a:t> </a:t>
+            </a:r>
+            <a:r>
+              <a:rPr lang="sk-SK" dirty="0" err="1"/>
+              <a:t>mass</a:t>
+            </a:r>
+            <a:r>
+              <a:rPr lang="sk-SK" dirty="0"/>
+              <a:t> </a:t>
+            </a:r>
+            <a:r>
+              <a:rPr lang="sk-SK" dirty="0" err="1"/>
+              <a:t>spectrometry</a:t>
+            </a:r>
+            <a:r>
+              <a:rPr lang="sk-SK" dirty="0"/>
+              <a:t> </a:t>
+            </a:r>
+            <a:r>
+              <a:rPr lang="sk-SK" dirty="0" err="1"/>
+              <a:t>data</a:t>
+            </a:r>
+            <a:r>
+              <a:rPr lang="sk-SK" dirty="0"/>
+              <a:t> </a:t>
+            </a:r>
+            <a:r>
+              <a:rPr lang="sk-SK" dirty="0" err="1"/>
+              <a:t>from</a:t>
+            </a:r>
+            <a:r>
+              <a:rPr lang="sk-SK" dirty="0"/>
+              <a:t> </a:t>
+            </a:r>
+            <a:r>
+              <a:rPr lang="sk-SK" dirty="0" err="1"/>
+              <a:t>two</a:t>
+            </a:r>
+            <a:r>
+              <a:rPr lang="sk-SK" dirty="0"/>
+              <a:t> </a:t>
+            </a:r>
+            <a:r>
+              <a:rPr lang="sk-SK" dirty="0" err="1"/>
+              <a:t>different</a:t>
+            </a:r>
+            <a:r>
+              <a:rPr lang="sk-SK" dirty="0"/>
+              <a:t> in-</a:t>
+            </a:r>
+            <a:r>
+              <a:rPr lang="sk-SK" dirty="0" err="1"/>
+              <a:t>silico</a:t>
+            </a:r>
+            <a:r>
+              <a:rPr lang="sk-SK" dirty="0"/>
+              <a:t> </a:t>
+            </a:r>
+            <a:r>
+              <a:rPr lang="sk-SK" dirty="0" err="1"/>
+              <a:t>spectral</a:t>
+            </a:r>
+            <a:r>
+              <a:rPr lang="sk-SK" dirty="0"/>
+              <a:t> </a:t>
+            </a:r>
+            <a:r>
+              <a:rPr lang="sk-SK" dirty="0" err="1"/>
+              <a:t>libraries</a:t>
+            </a:r>
+            <a:endParaRPr lang="sk-SK" dirty="0"/>
+          </a:p>
+          <a:p>
+            <a:pPr>
+              <a:buFont typeface="Arial" panose="020B0604020202020204" pitchFamily="34" charset="0"/>
+              <a:buChar char="•"/>
+            </a:pPr>
+            <a:r>
+              <a:rPr lang="sk-SK" dirty="0"/>
+              <a:t> </a:t>
+            </a:r>
+            <a:r>
+              <a:rPr lang="sk-SK" dirty="0" err="1"/>
+              <a:t>Evaluate</a:t>
+            </a:r>
+            <a:r>
+              <a:rPr lang="sk-SK" dirty="0"/>
+              <a:t> </a:t>
+            </a:r>
+            <a:r>
+              <a:rPr lang="sk-SK" dirty="0" err="1"/>
+              <a:t>defined</a:t>
+            </a:r>
+            <a:r>
+              <a:rPr lang="sk-SK" dirty="0"/>
+              <a:t> </a:t>
+            </a:r>
+            <a:r>
+              <a:rPr lang="sk-SK" dirty="0" err="1"/>
+              <a:t>criteria</a:t>
+            </a:r>
+            <a:r>
+              <a:rPr lang="sk-SK" dirty="0"/>
+              <a:t> on </a:t>
+            </a:r>
+            <a:r>
+              <a:rPr lang="sk-SK" dirty="0" err="1"/>
+              <a:t>both</a:t>
+            </a:r>
+            <a:r>
+              <a:rPr lang="sk-SK" dirty="0"/>
+              <a:t> </a:t>
+            </a:r>
+            <a:r>
+              <a:rPr lang="sk-SK" dirty="0" err="1"/>
+              <a:t>libraries</a:t>
+            </a:r>
+            <a:endParaRPr lang="sk-SK" dirty="0"/>
+          </a:p>
+          <a:p>
+            <a:pPr>
+              <a:buFont typeface="Arial" panose="020B0604020202020204" pitchFamily="34" charset="0"/>
+              <a:buChar char="•"/>
+            </a:pPr>
+            <a:r>
+              <a:rPr lang="sk-SK" dirty="0"/>
+              <a:t> </a:t>
+            </a:r>
+            <a:r>
+              <a:rPr lang="sk-SK" dirty="0" err="1"/>
+              <a:t>Compare</a:t>
+            </a:r>
+            <a:r>
+              <a:rPr lang="sk-SK" dirty="0"/>
+              <a:t> </a:t>
+            </a:r>
+            <a:r>
+              <a:rPr lang="sk-SK" dirty="0" err="1"/>
+              <a:t>performance</a:t>
+            </a:r>
+            <a:r>
+              <a:rPr lang="sk-SK" dirty="0"/>
+              <a:t> of </a:t>
+            </a:r>
+            <a:r>
+              <a:rPr lang="sk-SK" dirty="0" err="1"/>
+              <a:t>both</a:t>
+            </a:r>
+            <a:r>
+              <a:rPr lang="sk-SK" dirty="0"/>
+              <a:t> </a:t>
+            </a:r>
+            <a:r>
+              <a:rPr lang="sk-SK" dirty="0" err="1"/>
+              <a:t>libraries</a:t>
+            </a:r>
+            <a:endParaRPr lang="sk-SK" dirty="0"/>
+          </a:p>
+          <a:p>
+            <a:endParaRPr lang="en-GB" dirty="0"/>
           </a:p>
         </p:txBody>
       </p:sp>
@@ -8667,7 +9096,7 @@
           <p:cNvPr id="3" name="Zástupný objekt pre pätu 2">
             <a:extLst>
               <a:ext uri="{FF2B5EF4-FFF2-40B4-BE49-F238E27FC236}">
-                <a16:creationId xmlns:a16="http://schemas.microsoft.com/office/drawing/2014/main" id="{251DC6B9-A2BB-E997-C802-31820B4CA018}"/>
+                <a16:creationId xmlns:a16="http://schemas.microsoft.com/office/drawing/2014/main" id="{FBAF5F35-43E2-B268-21D2-7F628177F35F}"/>
               </a:ext>
             </a:extLst>
           </p:cNvPr>
@@ -8683,18 +9112,6 @@
           <a:bodyPr/>
           <a:lstStyle/>
           <a:p>
-            <a:r>
-              <a:rPr lang="sk-SK" dirty="0" err="1"/>
-              <a:t>Problem</a:t>
-            </a:r>
-            <a:r>
-              <a:rPr lang="sk-SK" dirty="0"/>
-              <a:t> </a:t>
-            </a:r>
-            <a:r>
-              <a:rPr lang="sk-SK" dirty="0" err="1"/>
-              <a:t>statement</a:t>
-            </a:r>
             <a:endParaRPr lang="en-GB" dirty="0"/>
           </a:p>
         </p:txBody>
@@ -8704,7 +9121,7 @@
           <p:cNvPr id="4" name="Zástupný objekt pre číslo snímky 3">
             <a:extLst>
               <a:ext uri="{FF2B5EF4-FFF2-40B4-BE49-F238E27FC236}">
-                <a16:creationId xmlns:a16="http://schemas.microsoft.com/office/drawing/2014/main" id="{2D9A30C1-C1BB-4B59-F673-1381E37D3280}"/>
+                <a16:creationId xmlns:a16="http://schemas.microsoft.com/office/drawing/2014/main" id="{21709162-78A9-F457-C057-8C26E8DD6D9B}"/>
               </a:ext>
             </a:extLst>
           </p:cNvPr>
@@ -8733,7 +9150,7 @@
           <p:cNvPr id="5" name="Nadpis 4">
             <a:extLst>
               <a:ext uri="{FF2B5EF4-FFF2-40B4-BE49-F238E27FC236}">
-                <a16:creationId xmlns:a16="http://schemas.microsoft.com/office/drawing/2014/main" id="{F90EB113-D645-BBDA-CE82-6BBA2163B89A}"/>
+                <a16:creationId xmlns:a16="http://schemas.microsoft.com/office/drawing/2014/main" id="{306F7A72-0B34-4FFF-20AF-AC2C84C14D42}"/>
               </a:ext>
             </a:extLst>
           </p:cNvPr>
@@ -8751,15 +9168,19 @@
           <a:p>
             <a:r>
               <a:rPr lang="sk-SK" dirty="0" err="1"/>
-              <a:t>Problem</a:t>
+              <a:t>Aims</a:t>
             </a:r>
             <a:r>
               <a:rPr lang="sk-SK" dirty="0"/>
-              <a:t> </a:t>
-            </a:r>
-            <a:r>
-              <a:rPr lang="sk-SK" dirty="0" err="1"/>
-              <a:t>Statement</a:t>
+              <a:t> of </a:t>
+            </a:r>
+            <a:r>
+              <a:rPr lang="sk-SK" dirty="0" err="1"/>
+              <a:t>the</a:t>
+            </a:r>
+            <a:r>
+              <a:rPr lang="sk-SK" dirty="0"/>
+              <a:t> Project</a:t>
             </a:r>
             <a:endParaRPr lang="en-GB" dirty="0"/>
           </a:p>
@@ -8768,7 +9189,7 @@
     </p:spTree>
     <p:extLst>
       <p:ext uri="{BB962C8B-B14F-4D97-AF65-F5344CB8AC3E}">
-        <p14:creationId xmlns:p14="http://schemas.microsoft.com/office/powerpoint/2010/main" val="474628617"/>
+        <p14:creationId xmlns:p14="http://schemas.microsoft.com/office/powerpoint/2010/main" val="2800583682"/>
       </p:ext>
     </p:extLst>
   </p:cSld>
@@ -9380,7 +9801,7 @@
             <p:ph type="tbl" sz="quarter" idx="13"/>
             <p:extLst>
               <p:ext uri="{D42A27DB-BD31-4B8C-83A1-F6EECF244321}">
-                <p14:modId xmlns:p14="http://schemas.microsoft.com/office/powerpoint/2010/main" val="3335784022"/>
+                <p14:modId xmlns:p14="http://schemas.microsoft.com/office/powerpoint/2010/main" val="1368240741"/>
               </p:ext>
             </p:extLst>
           </p:nvPr>
@@ -9431,6 +9852,7 @@
                     <a:bodyPr/>
                     <a:lstStyle/>
                     <a:p>
+                      <a:pPr algn="ctr"/>
                       <a:r>
                         <a:rPr lang="sk-SK" dirty="0"/>
                         <a:t>Hit</a:t>
@@ -9438,13 +9860,14 @@
                       <a:endParaRPr lang="en-GB" dirty="0"/>
                     </a:p>
                   </a:txBody>
-                  <a:tcPr/>
-                </a:tc>
-                <a:tc>
-                  <a:txBody>
-                    <a:bodyPr/>
-                    <a:lstStyle/>
-                    <a:p>
+                  <a:tcPr anchor="ctr"/>
+                </a:tc>
+                <a:tc>
+                  <a:txBody>
+                    <a:bodyPr/>
+                    <a:lstStyle/>
+                    <a:p>
+                      <a:pPr algn="ctr"/>
                       <a:r>
                         <a:rPr lang="sk-SK" dirty="0" err="1"/>
                         <a:t>InChIKey</a:t>
@@ -9452,13 +9875,14 @@
                       <a:endParaRPr lang="en-GB" dirty="0"/>
                     </a:p>
                   </a:txBody>
-                  <a:tcPr/>
-                </a:tc>
-                <a:tc>
-                  <a:txBody>
-                    <a:bodyPr/>
-                    <a:lstStyle/>
-                    <a:p>
+                  <a:tcPr anchor="ctr"/>
+                </a:tc>
+                <a:tc>
+                  <a:txBody>
+                    <a:bodyPr/>
+                    <a:lstStyle/>
+                    <a:p>
+                      <a:pPr algn="ctr"/>
                       <a:r>
                         <a:rPr lang="en-GB" sz="1800" b="1" i="0" kern="1200" dirty="0" err="1">
                           <a:solidFill>
@@ -9474,13 +9898,14 @@
                       <a:endParaRPr lang="en-GB" b="1" dirty="0"/>
                     </a:p>
                   </a:txBody>
-                  <a:tcPr/>
-                </a:tc>
-                <a:tc>
-                  <a:txBody>
-                    <a:bodyPr/>
-                    <a:lstStyle/>
-                    <a:p>
+                  <a:tcPr anchor="ctr"/>
+                </a:tc>
+                <a:tc>
+                  <a:txBody>
+                    <a:bodyPr/>
+                    <a:lstStyle/>
+                    <a:p>
+                      <a:pPr algn="ctr"/>
                       <a:r>
                         <a:rPr lang="sk-SK" dirty="0" err="1"/>
                         <a:t>Positivity</a:t>
@@ -9488,7 +9913,7 @@
                       <a:endParaRPr lang="en-GB" dirty="0"/>
                     </a:p>
                   </a:txBody>
-                  <a:tcPr/>
+                  <a:tcPr anchor="ctr"/>
                 </a:tc>
                 <a:extLst>
                   <a:ext uri="{0D108BD9-81ED-4DB2-BD59-A6C34878D82A}">
@@ -9851,7 +10276,7 @@
             <p:ph type="tbl" sz="quarter" idx="14"/>
             <p:extLst>
               <p:ext uri="{D42A27DB-BD31-4B8C-83A1-F6EECF244321}">
-                <p14:modId xmlns:p14="http://schemas.microsoft.com/office/powerpoint/2010/main" val="1731183069"/>
+                <p14:modId xmlns:p14="http://schemas.microsoft.com/office/powerpoint/2010/main" val="583100425"/>
               </p:ext>
             </p:extLst>
           </p:nvPr>
@@ -9902,6 +10327,7 @@
                     <a:bodyPr/>
                     <a:lstStyle/>
                     <a:p>
+                      <a:pPr algn="ctr"/>
                       <a:r>
                         <a:rPr lang="sk-SK" dirty="0"/>
                         <a:t>Hit</a:t>
@@ -9909,13 +10335,14 @@
                       <a:endParaRPr lang="en-GB" dirty="0"/>
                     </a:p>
                   </a:txBody>
-                  <a:tcPr/>
-                </a:tc>
-                <a:tc>
-                  <a:txBody>
-                    <a:bodyPr/>
-                    <a:lstStyle/>
-                    <a:p>
+                  <a:tcPr anchor="ctr"/>
+                </a:tc>
+                <a:tc>
+                  <a:txBody>
+                    <a:bodyPr/>
+                    <a:lstStyle/>
+                    <a:p>
+                      <a:pPr algn="ctr"/>
                       <a:r>
                         <a:rPr lang="sk-SK" dirty="0" err="1"/>
                         <a:t>InChIKey</a:t>
@@ -9923,14 +10350,14 @@
                       <a:endParaRPr lang="en-GB" dirty="0"/>
                     </a:p>
                   </a:txBody>
-                  <a:tcPr/>
-                </a:tc>
-                <a:tc>
-                  <a:txBody>
-                    <a:bodyPr/>
-                    <a:lstStyle/>
-                    <a:p>
-                      <a:pPr marL="0" marR="0" lvl="0" indent="0" algn="l" defTabSz="914400" rtl="0" eaLnBrk="1" fontAlgn="auto" latinLnBrk="0" hangingPunct="1">
+                  <a:tcPr anchor="ctr"/>
+                </a:tc>
+                <a:tc>
+                  <a:txBody>
+                    <a:bodyPr/>
+                    <a:lstStyle/>
+                    <a:p>
+                      <a:pPr marL="0" marR="0" lvl="0" indent="0" algn="ctr" defTabSz="914400" rtl="0" eaLnBrk="1" fontAlgn="auto" latinLnBrk="0" hangingPunct="1">
                         <a:lnSpc>
                           <a:spcPct val="100000"/>
                         </a:lnSpc>
@@ -9962,14 +10389,14 @@
                       <a:endParaRPr lang="en-GB" b="1" dirty="0"/>
                     </a:p>
                   </a:txBody>
-                  <a:tcPr/>
-                </a:tc>
-                <a:tc>
-                  <a:txBody>
-                    <a:bodyPr/>
-                    <a:lstStyle/>
-                    <a:p>
-                      <a:pPr marL="0" marR="0" lvl="0" indent="0" algn="l" defTabSz="914400" rtl="0" eaLnBrk="1" fontAlgn="auto" latinLnBrk="0" hangingPunct="1">
+                  <a:tcPr anchor="ctr"/>
+                </a:tc>
+                <a:tc>
+                  <a:txBody>
+                    <a:bodyPr/>
+                    <a:lstStyle/>
+                    <a:p>
+                      <a:pPr marL="0" marR="0" lvl="0" indent="0" algn="ctr" defTabSz="914400" rtl="0" eaLnBrk="1" fontAlgn="auto" latinLnBrk="0" hangingPunct="1">
                         <a:lnSpc>
                           <a:spcPct val="100000"/>
                         </a:lnSpc>
@@ -9993,7 +10420,7 @@
                       <a:endParaRPr lang="en-GB" dirty="0"/>
                     </a:p>
                   </a:txBody>
-                  <a:tcPr/>
+                  <a:tcPr anchor="ctr"/>
                 </a:tc>
                 <a:extLst>
                   <a:ext uri="{0D108BD9-81ED-4DB2-BD59-A6C34878D82A}">
@@ -10547,7 +10974,7 @@
             <p:ph type="tbl" sz="quarter" idx="14"/>
             <p:extLst>
               <p:ext uri="{D42A27DB-BD31-4B8C-83A1-F6EECF244321}">
-                <p14:modId xmlns:p14="http://schemas.microsoft.com/office/powerpoint/2010/main" val="2713437917"/>
+                <p14:modId xmlns:p14="http://schemas.microsoft.com/office/powerpoint/2010/main" val="2575245142"/>
               </p:ext>
             </p:extLst>
           </p:nvPr>
@@ -10612,6 +11039,7 @@
                     <a:bodyPr/>
                     <a:lstStyle/>
                     <a:p>
+                      <a:pPr algn="ctr"/>
                       <a:r>
                         <a:rPr lang="sk-SK" sz="1200" dirty="0"/>
                         <a:t>Hit</a:t>
@@ -10619,13 +11047,14 @@
                       <a:endParaRPr lang="en-GB" sz="1200" dirty="0"/>
                     </a:p>
                   </a:txBody>
-                  <a:tcPr/>
-                </a:tc>
-                <a:tc>
-                  <a:txBody>
-                    <a:bodyPr/>
-                    <a:lstStyle/>
-                    <a:p>
+                  <a:tcPr anchor="ctr"/>
+                </a:tc>
+                <a:tc>
+                  <a:txBody>
+                    <a:bodyPr/>
+                    <a:lstStyle/>
+                    <a:p>
+                      <a:pPr algn="ctr"/>
                       <a:r>
                         <a:rPr lang="sk-SK" sz="1200" dirty="0"/>
                         <a:t>Polarity</a:t>
@@ -10633,13 +11062,14 @@
                       <a:endParaRPr lang="en-GB" sz="1200" dirty="0"/>
                     </a:p>
                   </a:txBody>
-                  <a:tcPr/>
-                </a:tc>
-                <a:tc>
-                  <a:txBody>
-                    <a:bodyPr/>
-                    <a:lstStyle/>
-                    <a:p>
+                  <a:tcPr anchor="ctr"/>
+                </a:tc>
+                <a:tc>
+                  <a:txBody>
+                    <a:bodyPr/>
+                    <a:lstStyle/>
+                    <a:p>
+                      <a:pPr algn="ctr"/>
                       <a:r>
                         <a:rPr lang="sk-SK" sz="1200" dirty="0" err="1"/>
                         <a:t>ScanRange</a:t>
@@ -10647,6 +11077,7 @@
                       <a:endParaRPr lang="sk-SK" sz="1200" dirty="0"/>
                     </a:p>
                     <a:p>
+                      <a:pPr algn="ctr"/>
                       <a:r>
                         <a:rPr lang="sk-SK" sz="1200" dirty="0"/>
                         <a:t>Max</a:t>
@@ -10654,13 +11085,14 @@
                       <a:endParaRPr lang="en-GB" sz="1200" dirty="0"/>
                     </a:p>
                   </a:txBody>
-                  <a:tcPr/>
-                </a:tc>
-                <a:tc>
-                  <a:txBody>
-                    <a:bodyPr/>
-                    <a:lstStyle/>
-                    <a:p>
+                  <a:tcPr anchor="ctr"/>
+                </a:tc>
+                <a:tc>
+                  <a:txBody>
+                    <a:bodyPr/>
+                    <a:lstStyle/>
+                    <a:p>
+                      <a:pPr algn="ctr"/>
                       <a:r>
                         <a:rPr lang="sk-SK" sz="1200" dirty="0" err="1"/>
                         <a:t>ScanRange</a:t>
@@ -10668,6 +11100,7 @@
                       <a:endParaRPr lang="sk-SK" sz="1200" dirty="0"/>
                     </a:p>
                     <a:p>
+                      <a:pPr algn="ctr"/>
                       <a:r>
                         <a:rPr lang="sk-SK" sz="1200" dirty="0"/>
                         <a:t>Min</a:t>
@@ -10675,13 +11108,14 @@
                       <a:endParaRPr lang="en-GB" sz="1200" dirty="0"/>
                     </a:p>
                   </a:txBody>
-                  <a:tcPr/>
-                </a:tc>
-                <a:tc>
-                  <a:txBody>
-                    <a:bodyPr/>
-                    <a:lstStyle/>
-                    <a:p>
+                  <a:tcPr anchor="ctr"/>
+                </a:tc>
+                <a:tc>
+                  <a:txBody>
+                    <a:bodyPr/>
+                    <a:lstStyle/>
+                    <a:p>
+                      <a:pPr algn="ctr"/>
                       <a:r>
                         <a:rPr lang="sk-SK" sz="1200" dirty="0"/>
                         <a:t>NCE</a:t>
@@ -10689,13 +11123,14 @@
                       <a:endParaRPr lang="en-GB" sz="1200" dirty="0"/>
                     </a:p>
                   </a:txBody>
-                  <a:tcPr/>
-                </a:tc>
-                <a:tc>
-                  <a:txBody>
-                    <a:bodyPr/>
-                    <a:lstStyle/>
-                    <a:p>
+                  <a:tcPr anchor="ctr"/>
+                </a:tc>
+                <a:tc>
+                  <a:txBody>
+                    <a:bodyPr/>
+                    <a:lstStyle/>
+                    <a:p>
+                      <a:pPr algn="ctr"/>
                       <a:r>
                         <a:rPr lang="sk-SK" sz="1200" dirty="0" err="1"/>
                         <a:t>Ion</a:t>
@@ -10703,6 +11138,7 @@
                       <a:endParaRPr lang="sk-SK" sz="1200" dirty="0"/>
                     </a:p>
                     <a:p>
+                      <a:pPr algn="ctr"/>
                       <a:r>
                         <a:rPr lang="sk-SK" sz="1200" dirty="0" err="1"/>
                         <a:t>Activation</a:t>
@@ -10710,7 +11146,7 @@
                       <a:endParaRPr lang="en-GB" sz="1200" dirty="0"/>
                     </a:p>
                   </a:txBody>
-                  <a:tcPr/>
+                  <a:tcPr anchor="ctr"/>
                 </a:tc>
                 <a:extLst>
                   <a:ext uri="{0D108BD9-81ED-4DB2-BD59-A6C34878D82A}">
@@ -11269,7 +11705,7 @@
             <p:ph type="tbl" sz="quarter" idx="13"/>
             <p:extLst>
               <p:ext uri="{D42A27DB-BD31-4B8C-83A1-F6EECF244321}">
-                <p14:modId xmlns:p14="http://schemas.microsoft.com/office/powerpoint/2010/main" val="638943434"/>
+                <p14:modId xmlns:p14="http://schemas.microsoft.com/office/powerpoint/2010/main" val="3664528447"/>
               </p:ext>
             </p:extLst>
           </p:nvPr>
@@ -11334,6 +11770,7 @@
                     <a:bodyPr/>
                     <a:lstStyle/>
                     <a:p>
+                      <a:pPr algn="ctr"/>
                       <a:r>
                         <a:rPr lang="sk-SK" sz="1200" dirty="0"/>
                         <a:t>Hit</a:t>
@@ -11341,13 +11778,14 @@
                       <a:endParaRPr lang="en-GB" sz="1200" dirty="0"/>
                     </a:p>
                   </a:txBody>
-                  <a:tcPr/>
-                </a:tc>
-                <a:tc>
-                  <a:txBody>
-                    <a:bodyPr/>
-                    <a:lstStyle/>
-                    <a:p>
+                  <a:tcPr anchor="ctr"/>
+                </a:tc>
+                <a:tc>
+                  <a:txBody>
+                    <a:bodyPr/>
+                    <a:lstStyle/>
+                    <a:p>
+                      <a:pPr algn="ctr"/>
                       <a:r>
                         <a:rPr lang="sk-SK" sz="1200" dirty="0"/>
                         <a:t>Polarity</a:t>
@@ -11355,13 +11793,14 @@
                       <a:endParaRPr lang="en-GB" sz="1200" dirty="0"/>
                     </a:p>
                   </a:txBody>
-                  <a:tcPr/>
-                </a:tc>
-                <a:tc>
-                  <a:txBody>
-                    <a:bodyPr/>
-                    <a:lstStyle/>
-                    <a:p>
+                  <a:tcPr anchor="ctr"/>
+                </a:tc>
+                <a:tc>
+                  <a:txBody>
+                    <a:bodyPr/>
+                    <a:lstStyle/>
+                    <a:p>
+                      <a:pPr algn="ctr"/>
                       <a:r>
                         <a:rPr lang="sk-SK" sz="1200" dirty="0" err="1"/>
                         <a:t>ScanRange</a:t>
@@ -11369,6 +11808,7 @@
                       <a:endParaRPr lang="sk-SK" sz="1200" dirty="0"/>
                     </a:p>
                     <a:p>
+                      <a:pPr algn="ctr"/>
                       <a:r>
                         <a:rPr lang="sk-SK" sz="1200" dirty="0"/>
                         <a:t>Max</a:t>
@@ -11376,13 +11816,14 @@
                       <a:endParaRPr lang="en-GB" sz="1200" dirty="0"/>
                     </a:p>
                   </a:txBody>
-                  <a:tcPr/>
-                </a:tc>
-                <a:tc>
-                  <a:txBody>
-                    <a:bodyPr/>
-                    <a:lstStyle/>
-                    <a:p>
+                  <a:tcPr anchor="ctr"/>
+                </a:tc>
+                <a:tc>
+                  <a:txBody>
+                    <a:bodyPr/>
+                    <a:lstStyle/>
+                    <a:p>
+                      <a:pPr algn="ctr"/>
                       <a:r>
                         <a:rPr lang="sk-SK" sz="1200" dirty="0" err="1"/>
                         <a:t>ScanRange</a:t>
@@ -11390,6 +11831,7 @@
                       <a:endParaRPr lang="sk-SK" sz="1200" dirty="0"/>
                     </a:p>
                     <a:p>
+                      <a:pPr algn="ctr"/>
                       <a:r>
                         <a:rPr lang="sk-SK" sz="1200" dirty="0"/>
                         <a:t>Min</a:t>
@@ -11397,13 +11839,14 @@
                       <a:endParaRPr lang="en-GB" sz="1200" dirty="0"/>
                     </a:p>
                   </a:txBody>
-                  <a:tcPr/>
-                </a:tc>
-                <a:tc>
-                  <a:txBody>
-                    <a:bodyPr/>
-                    <a:lstStyle/>
-                    <a:p>
+                  <a:tcPr anchor="ctr"/>
+                </a:tc>
+                <a:tc>
+                  <a:txBody>
+                    <a:bodyPr/>
+                    <a:lstStyle/>
+                    <a:p>
+                      <a:pPr algn="ctr"/>
                       <a:r>
                         <a:rPr lang="sk-SK" sz="1200" dirty="0"/>
                         <a:t>NCE</a:t>
@@ -11411,13 +11854,14 @@
                       <a:endParaRPr lang="en-GB" sz="1200" dirty="0"/>
                     </a:p>
                   </a:txBody>
-                  <a:tcPr/>
-                </a:tc>
-                <a:tc>
-                  <a:txBody>
-                    <a:bodyPr/>
-                    <a:lstStyle/>
-                    <a:p>
+                  <a:tcPr anchor="ctr"/>
+                </a:tc>
+                <a:tc>
+                  <a:txBody>
+                    <a:bodyPr/>
+                    <a:lstStyle/>
+                    <a:p>
+                      <a:pPr algn="ctr"/>
                       <a:r>
                         <a:rPr lang="sk-SK" sz="1200" dirty="0" err="1"/>
                         <a:t>Ion</a:t>
@@ -11425,6 +11869,7 @@
                       <a:endParaRPr lang="sk-SK" sz="1200" dirty="0"/>
                     </a:p>
                     <a:p>
+                      <a:pPr algn="ctr"/>
                       <a:r>
                         <a:rPr lang="sk-SK" sz="1200" dirty="0" err="1"/>
                         <a:t>Activation</a:t>
@@ -11432,7 +11877,7 @@
                       <a:endParaRPr lang="en-GB" sz="1200" dirty="0"/>
                     </a:p>
                   </a:txBody>
-                  <a:tcPr/>
+                  <a:tcPr anchor="ctr"/>
                 </a:tc>
                 <a:extLst>
                   <a:ext uri="{0D108BD9-81ED-4DB2-BD59-A6C34878D82A}">
@@ -14684,8 +15129,8 @@
         </p:blipFill>
         <p:spPr>
           <a:xfrm>
-            <a:off x="6426987" y="3050646"/>
-            <a:ext cx="4517721" cy="3011813"/>
+            <a:off x="6426988" y="3050646"/>
+            <a:ext cx="4517719" cy="3011813"/>
           </a:xfrm>
           <a:prstGeom prst="rect">
             <a:avLst/>
@@ -14719,8 +15164,8 @@
         </p:blipFill>
         <p:spPr>
           <a:xfrm>
-            <a:off x="1247293" y="3050643"/>
-            <a:ext cx="4517721" cy="3011813"/>
+            <a:off x="1247294" y="3050643"/>
+            <a:ext cx="4517719" cy="3011813"/>
           </a:xfrm>
           <a:prstGeom prst="rect">
             <a:avLst/>

</xml_diff>

<commit_message>
Added at least one correct/incorrect comparison
</commit_message>
<xml_diff>
--- a/Presentation/Prezentácia_MS_Library.pptx
+++ b/Presentation/Prezentácia_MS_Library.pptx
@@ -5,7 +5,7 @@
     <p:sldMasterId id="2147483660" r:id="rId1"/>
   </p:sldMasterIdLst>
   <p:notesMasterIdLst>
-    <p:notesMasterId r:id="rId22"/>
+    <p:notesMasterId r:id="rId23"/>
   </p:notesMasterIdLst>
   <p:sldIdLst>
     <p:sldId id="256" r:id="rId2"/>
@@ -28,6 +28,7 @@
     <p:sldId id="268" r:id="rId19"/>
     <p:sldId id="270" r:id="rId20"/>
     <p:sldId id="271" r:id="rId21"/>
+    <p:sldId id="279" r:id="rId22"/>
   </p:sldIdLst>
   <p:sldSz cx="12192000" cy="6858000"/>
   <p:notesSz cx="6858000" cy="9144000"/>
@@ -8483,15 +8484,7 @@
           <a:p>
             <a:r>
               <a:rPr lang="sk-SK" dirty="0" err="1"/>
-              <a:t>Problem</a:t>
-            </a:r>
-            <a:r>
-              <a:rPr lang="sk-SK" dirty="0"/>
-              <a:t> </a:t>
-            </a:r>
-            <a:r>
-              <a:rPr lang="sk-SK" dirty="0" err="1"/>
-              <a:t>statement</a:t>
+              <a:t>introduction</a:t>
             </a:r>
             <a:endParaRPr lang="en-GB" dirty="0"/>
           </a:p>
@@ -8876,6 +8869,634 @@
 </p:sld>
 </file>
 
+<file path=ppt/slides/slide21.xml><?xml version="1.0" encoding="utf-8"?>
+<p:sld xmlns:a="http://schemas.openxmlformats.org/drawingml/2006/main" xmlns:r="http://schemas.openxmlformats.org/officeDocument/2006/relationships" xmlns:p="http://schemas.openxmlformats.org/presentationml/2006/main">
+  <p:cSld>
+    <p:spTree>
+      <p:nvGrpSpPr>
+        <p:cNvPr id="1" name=""/>
+        <p:cNvGrpSpPr/>
+        <p:nvPr/>
+      </p:nvGrpSpPr>
+      <p:grpSpPr>
+        <a:xfrm>
+          <a:off x="0" y="0"/>
+          <a:ext cx="0" cy="0"/>
+          <a:chOff x="0" y="0"/>
+          <a:chExt cx="0" cy="0"/>
+        </a:xfrm>
+      </p:grpSpPr>
+      <p:sp>
+        <p:nvSpPr>
+          <p:cNvPr id="2" name="Nadpis 1">
+            <a:extLst>
+              <a:ext uri="{FF2B5EF4-FFF2-40B4-BE49-F238E27FC236}">
+                <a16:creationId xmlns:a16="http://schemas.microsoft.com/office/drawing/2014/main" id="{8D683B8D-6B0A-0BB1-CE61-000F5A58F73D}"/>
+              </a:ext>
+            </a:extLst>
+          </p:cNvPr>
+          <p:cNvSpPr>
+            <a:spLocks noGrp="1"/>
+          </p:cNvSpPr>
+          <p:nvPr>
+            <p:ph type="title"/>
+          </p:nvPr>
+        </p:nvSpPr>
+        <p:spPr/>
+        <p:txBody>
+          <a:bodyPr/>
+          <a:lstStyle/>
+          <a:p>
+            <a:r>
+              <a:rPr lang="sk-SK" dirty="0" err="1"/>
+              <a:t>Results</a:t>
+            </a:r>
+            <a:endParaRPr lang="en-GB" dirty="0"/>
+          </a:p>
+        </p:txBody>
+      </p:sp>
+      <p:sp>
+        <p:nvSpPr>
+          <p:cNvPr id="3" name="Zástupný text 2">
+            <a:extLst>
+              <a:ext uri="{FF2B5EF4-FFF2-40B4-BE49-F238E27FC236}">
+                <a16:creationId xmlns:a16="http://schemas.microsoft.com/office/drawing/2014/main" id="{F633AF74-AF3C-76EB-73DE-6B7A25945A42}"/>
+              </a:ext>
+            </a:extLst>
+          </p:cNvPr>
+          <p:cNvSpPr>
+            <a:spLocks noGrp="1"/>
+          </p:cNvSpPr>
+          <p:nvPr>
+            <p:ph type="body" idx="1"/>
+          </p:nvPr>
+        </p:nvSpPr>
+        <p:spPr/>
+        <p:txBody>
+          <a:bodyPr/>
+          <a:lstStyle/>
+          <a:p>
+            <a:r>
+              <a:rPr lang="sk-SK" dirty="0" err="1"/>
+              <a:t>Synthetic</a:t>
+            </a:r>
+            <a:r>
+              <a:rPr lang="sk-SK" dirty="0"/>
+              <a:t> </a:t>
+            </a:r>
+            <a:r>
+              <a:rPr lang="sk-SK" dirty="0" err="1"/>
+              <a:t>search</a:t>
+            </a:r>
+            <a:endParaRPr lang="en-GB" dirty="0"/>
+          </a:p>
+        </p:txBody>
+      </p:sp>
+      <p:sp>
+        <p:nvSpPr>
+          <p:cNvPr id="4" name="Zástupný text 3">
+            <a:extLst>
+              <a:ext uri="{FF2B5EF4-FFF2-40B4-BE49-F238E27FC236}">
+                <a16:creationId xmlns:a16="http://schemas.microsoft.com/office/drawing/2014/main" id="{33F58994-AE23-F061-EB4F-EE9E756D777F}"/>
+              </a:ext>
+            </a:extLst>
+          </p:cNvPr>
+          <p:cNvSpPr>
+            <a:spLocks noGrp="1"/>
+          </p:cNvSpPr>
+          <p:nvPr>
+            <p:ph type="body" sz="quarter" idx="3"/>
+          </p:nvPr>
+        </p:nvSpPr>
+        <p:spPr/>
+        <p:txBody>
+          <a:bodyPr/>
+          <a:lstStyle/>
+          <a:p>
+            <a:r>
+              <a:rPr lang="sk-SK" dirty="0" err="1"/>
+              <a:t>Barcode</a:t>
+            </a:r>
+            <a:r>
+              <a:rPr lang="sk-SK" dirty="0"/>
+              <a:t> </a:t>
+            </a:r>
+            <a:r>
+              <a:rPr lang="sk-SK" dirty="0" err="1"/>
+              <a:t>search</a:t>
+            </a:r>
+            <a:endParaRPr lang="en-GB" dirty="0"/>
+          </a:p>
+        </p:txBody>
+      </p:sp>
+      <p:sp>
+        <p:nvSpPr>
+          <p:cNvPr id="5" name="Zástupný objekt pre pätu 4">
+            <a:extLst>
+              <a:ext uri="{FF2B5EF4-FFF2-40B4-BE49-F238E27FC236}">
+                <a16:creationId xmlns:a16="http://schemas.microsoft.com/office/drawing/2014/main" id="{D41BB648-9ADE-0718-16AD-00B9D90C4D24}"/>
+              </a:ext>
+            </a:extLst>
+          </p:cNvPr>
+          <p:cNvSpPr>
+            <a:spLocks noGrp="1"/>
+          </p:cNvSpPr>
+          <p:nvPr>
+            <p:ph type="ftr" sz="quarter" idx="11"/>
+          </p:nvPr>
+        </p:nvSpPr>
+        <p:spPr/>
+        <p:txBody>
+          <a:bodyPr/>
+          <a:lstStyle/>
+          <a:p>
+            <a:r>
+              <a:rPr lang="sk-SK" dirty="0"/>
+              <a:t>LOAD</a:t>
+            </a:r>
+            <a:endParaRPr lang="en-GB" dirty="0"/>
+          </a:p>
+        </p:txBody>
+      </p:sp>
+      <p:sp>
+        <p:nvSpPr>
+          <p:cNvPr id="6" name="Zástupný objekt pre číslo snímky 5">
+            <a:extLst>
+              <a:ext uri="{FF2B5EF4-FFF2-40B4-BE49-F238E27FC236}">
+                <a16:creationId xmlns:a16="http://schemas.microsoft.com/office/drawing/2014/main" id="{668F34C2-1660-BF79-ED79-16C694DAB775}"/>
+              </a:ext>
+            </a:extLst>
+          </p:cNvPr>
+          <p:cNvSpPr>
+            <a:spLocks noGrp="1"/>
+          </p:cNvSpPr>
+          <p:nvPr>
+            <p:ph type="sldNum" sz="quarter" idx="12"/>
+          </p:nvPr>
+        </p:nvSpPr>
+        <p:spPr/>
+        <p:txBody>
+          <a:bodyPr/>
+          <a:lstStyle/>
+          <a:p>
+            <a:fld id="{DE705D6D-556F-40DC-B257-26888D1A9A33}" type="slidenum">
+              <a:rPr lang="en-GB" smtClean="0"/>
+              <a:t>21</a:t>
+            </a:fld>
+            <a:endParaRPr lang="en-GB"/>
+          </a:p>
+        </p:txBody>
+      </p:sp>
+      <p:graphicFrame>
+        <p:nvGraphicFramePr>
+          <p:cNvPr id="13" name="Tabuľka 13">
+            <a:extLst>
+              <a:ext uri="{FF2B5EF4-FFF2-40B4-BE49-F238E27FC236}">
+                <a16:creationId xmlns:a16="http://schemas.microsoft.com/office/drawing/2014/main" id="{72D56B76-8977-696A-B466-3E0CF276F638}"/>
+              </a:ext>
+            </a:extLst>
+          </p:cNvPr>
+          <p:cNvGraphicFramePr>
+            <a:graphicFrameLocks noGrp="1"/>
+          </p:cNvGraphicFramePr>
+          <p:nvPr>
+            <p:ph type="tbl" sz="quarter" idx="13"/>
+            <p:extLst>
+              <p:ext uri="{D42A27DB-BD31-4B8C-83A1-F6EECF244321}">
+                <p14:modId xmlns:p14="http://schemas.microsoft.com/office/powerpoint/2010/main" val="3387430475"/>
+              </p:ext>
+            </p:extLst>
+          </p:nvPr>
+        </p:nvGraphicFramePr>
+        <p:xfrm>
+          <a:off x="1096963" y="3049588"/>
+          <a:ext cx="4938712" cy="1112520"/>
+        </p:xfrm>
+        <a:graphic>
+          <a:graphicData uri="http://schemas.openxmlformats.org/drawingml/2006/table">
+            <a:tbl>
+              <a:tblPr firstRow="1" bandRow="1">
+                <a:tableStyleId>{5C22544A-7EE6-4342-B048-85BDC9FD1C3A}</a:tableStyleId>
+              </a:tblPr>
+              <a:tblGrid>
+                <a:gridCol w="2469356">
+                  <a:extLst>
+                    <a:ext uri="{9D8B030D-6E8A-4147-A177-3AD203B41FA5}">
+                      <a16:colId xmlns:a16="http://schemas.microsoft.com/office/drawing/2014/main" val="1988163031"/>
+                    </a:ext>
+                  </a:extLst>
+                </a:gridCol>
+                <a:gridCol w="2469356">
+                  <a:extLst>
+                    <a:ext uri="{9D8B030D-6E8A-4147-A177-3AD203B41FA5}">
+                      <a16:colId xmlns:a16="http://schemas.microsoft.com/office/drawing/2014/main" val="3914734257"/>
+                    </a:ext>
+                  </a:extLst>
+                </a:gridCol>
+              </a:tblGrid>
+              <a:tr h="370840">
+                <a:tc gridSpan="2">
+                  <a:txBody>
+                    <a:bodyPr/>
+                    <a:lstStyle/>
+                    <a:p>
+                      <a:pPr algn="ctr"/>
+                      <a:r>
+                        <a:rPr lang="sk-SK" dirty="0" err="1"/>
+                        <a:t>Synthetic</a:t>
+                      </a:r>
+                      <a:endParaRPr lang="en-GB" dirty="0"/>
+                    </a:p>
+                  </a:txBody>
+                  <a:tcPr anchor="ctr"/>
+                </a:tc>
+                <a:tc hMerge="1">
+                  <a:txBody>
+                    <a:bodyPr/>
+                    <a:lstStyle/>
+                    <a:p>
+                      <a:endParaRPr lang="en-GB" dirty="0"/>
+                    </a:p>
+                  </a:txBody>
+                  <a:tcPr/>
+                </a:tc>
+                <a:extLst>
+                  <a:ext uri="{0D108BD9-81ED-4DB2-BD59-A6C34878D82A}">
+                    <a16:rowId xmlns:a16="http://schemas.microsoft.com/office/drawing/2014/main" val="2292982325"/>
+                  </a:ext>
+                </a:extLst>
+              </a:tr>
+              <a:tr h="370840">
+                <a:tc>
+                  <a:txBody>
+                    <a:bodyPr/>
+                    <a:lstStyle/>
+                    <a:p>
+                      <a:pPr algn="ctr"/>
+                      <a:r>
+                        <a:rPr lang="sk-SK" dirty="0"/>
+                        <a:t>At </a:t>
+                      </a:r>
+                      <a:r>
+                        <a:rPr lang="sk-SK" dirty="0" err="1"/>
+                        <a:t>least</a:t>
+                      </a:r>
+                      <a:r>
+                        <a:rPr lang="sk-SK" dirty="0"/>
+                        <a:t> </a:t>
+                      </a:r>
+                      <a:r>
+                        <a:rPr lang="sk-SK" dirty="0" err="1"/>
+                        <a:t>one</a:t>
+                      </a:r>
+                      <a:r>
+                        <a:rPr lang="sk-SK" dirty="0"/>
+                        <a:t> </a:t>
+                      </a:r>
+                      <a:r>
+                        <a:rPr lang="sk-SK" dirty="0" err="1"/>
+                        <a:t>correct</a:t>
+                      </a:r>
+                      <a:r>
+                        <a:rPr lang="sk-SK" dirty="0"/>
+                        <a:t> hit</a:t>
+                      </a:r>
+                      <a:endParaRPr lang="en-GB" dirty="0"/>
+                    </a:p>
+                  </a:txBody>
+                  <a:tcPr anchor="ctr"/>
+                </a:tc>
+                <a:tc>
+                  <a:txBody>
+                    <a:bodyPr/>
+                    <a:lstStyle/>
+                    <a:p>
+                      <a:pPr algn="ctr"/>
+                      <a:r>
+                        <a:rPr lang="sk-SK" dirty="0"/>
+                        <a:t>85</a:t>
+                      </a:r>
+                      <a:endParaRPr lang="en-GB" dirty="0"/>
+                    </a:p>
+                  </a:txBody>
+                  <a:tcPr anchor="ctr"/>
+                </a:tc>
+                <a:extLst>
+                  <a:ext uri="{0D108BD9-81ED-4DB2-BD59-A6C34878D82A}">
+                    <a16:rowId xmlns:a16="http://schemas.microsoft.com/office/drawing/2014/main" val="4042165234"/>
+                  </a:ext>
+                </a:extLst>
+              </a:tr>
+              <a:tr h="370840">
+                <a:tc>
+                  <a:txBody>
+                    <a:bodyPr/>
+                    <a:lstStyle/>
+                    <a:p>
+                      <a:pPr algn="ctr"/>
+                      <a:r>
+                        <a:rPr lang="sk-SK" dirty="0" err="1"/>
+                        <a:t>Only</a:t>
+                      </a:r>
+                      <a:r>
+                        <a:rPr lang="sk-SK" dirty="0"/>
+                        <a:t> </a:t>
+                      </a:r>
+                      <a:r>
+                        <a:rPr lang="sk-SK" dirty="0" err="1"/>
+                        <a:t>incorrect</a:t>
+                      </a:r>
+                      <a:r>
+                        <a:rPr lang="sk-SK" dirty="0"/>
+                        <a:t> </a:t>
+                      </a:r>
+                      <a:r>
+                        <a:rPr lang="sk-SK" dirty="0" err="1"/>
+                        <a:t>hits</a:t>
+                      </a:r>
+                      <a:endParaRPr lang="en-GB" dirty="0"/>
+                    </a:p>
+                  </a:txBody>
+                  <a:tcPr anchor="ctr"/>
+                </a:tc>
+                <a:tc>
+                  <a:txBody>
+                    <a:bodyPr/>
+                    <a:lstStyle/>
+                    <a:p>
+                      <a:pPr algn="ctr"/>
+                      <a:r>
+                        <a:rPr lang="sk-SK" dirty="0"/>
+                        <a:t>10</a:t>
+                      </a:r>
+                      <a:endParaRPr lang="en-GB" dirty="0"/>
+                    </a:p>
+                  </a:txBody>
+                  <a:tcPr anchor="ctr"/>
+                </a:tc>
+                <a:extLst>
+                  <a:ext uri="{0D108BD9-81ED-4DB2-BD59-A6C34878D82A}">
+                    <a16:rowId xmlns:a16="http://schemas.microsoft.com/office/drawing/2014/main" val="3338712773"/>
+                  </a:ext>
+                </a:extLst>
+              </a:tr>
+            </a:tbl>
+          </a:graphicData>
+        </a:graphic>
+      </p:graphicFrame>
+      <p:sp>
+        <p:nvSpPr>
+          <p:cNvPr id="9" name="Zástupný text 8">
+            <a:extLst>
+              <a:ext uri="{FF2B5EF4-FFF2-40B4-BE49-F238E27FC236}">
+                <a16:creationId xmlns:a16="http://schemas.microsoft.com/office/drawing/2014/main" id="{EB476054-82BB-5A0A-144C-D75DFF14389F}"/>
+              </a:ext>
+            </a:extLst>
+          </p:cNvPr>
+          <p:cNvSpPr>
+            <a:spLocks noGrp="1"/>
+          </p:cNvSpPr>
+          <p:nvPr>
+            <p:ph type="body" sz="quarter" idx="15"/>
+          </p:nvPr>
+        </p:nvSpPr>
+        <p:spPr/>
+        <p:txBody>
+          <a:bodyPr/>
+          <a:lstStyle/>
+          <a:p>
+            <a:r>
+              <a:rPr lang="sk-SK" dirty="0"/>
+              <a:t>VI. </a:t>
+            </a:r>
+            <a:r>
+              <a:rPr lang="en-GB" dirty="0"/>
+              <a:t>Find a reasonable way to compare the search performance of two libraries</a:t>
+            </a:r>
+            <a:r>
+              <a:rPr lang="sk-SK" dirty="0"/>
+              <a:t> </a:t>
+            </a:r>
+            <a:endParaRPr lang="en-GB" dirty="0"/>
+          </a:p>
+          <a:p>
+            <a:pPr marL="0" indent="0">
+              <a:buNone/>
+            </a:pPr>
+            <a:endParaRPr lang="en-GB" dirty="0"/>
+          </a:p>
+        </p:txBody>
+      </p:sp>
+      <p:graphicFrame>
+        <p:nvGraphicFramePr>
+          <p:cNvPr id="14" name="Zástupný objekt pre tabuľku 13">
+            <a:extLst>
+              <a:ext uri="{FF2B5EF4-FFF2-40B4-BE49-F238E27FC236}">
+                <a16:creationId xmlns:a16="http://schemas.microsoft.com/office/drawing/2014/main" id="{C1643467-A698-2AC7-C473-FA0C30CAB2F9}"/>
+              </a:ext>
+            </a:extLst>
+          </p:cNvPr>
+          <p:cNvGraphicFramePr>
+            <a:graphicFrameLocks noGrp="1"/>
+          </p:cNvGraphicFramePr>
+          <p:nvPr>
+            <p:ph type="tbl" sz="quarter" idx="14"/>
+            <p:extLst>
+              <p:ext uri="{D42A27DB-BD31-4B8C-83A1-F6EECF244321}">
+                <p14:modId xmlns:p14="http://schemas.microsoft.com/office/powerpoint/2010/main" val="3617163406"/>
+              </p:ext>
+            </p:extLst>
+          </p:nvPr>
+        </p:nvGraphicFramePr>
+        <p:xfrm>
+          <a:off x="6216650" y="3049588"/>
+          <a:ext cx="4938712" cy="1112520"/>
+        </p:xfrm>
+        <a:graphic>
+          <a:graphicData uri="http://schemas.openxmlformats.org/drawingml/2006/table">
+            <a:tbl>
+              <a:tblPr firstRow="1" bandRow="1">
+                <a:tableStyleId>{5C22544A-7EE6-4342-B048-85BDC9FD1C3A}</a:tableStyleId>
+              </a:tblPr>
+              <a:tblGrid>
+                <a:gridCol w="2469356">
+                  <a:extLst>
+                    <a:ext uri="{9D8B030D-6E8A-4147-A177-3AD203B41FA5}">
+                      <a16:colId xmlns:a16="http://schemas.microsoft.com/office/drawing/2014/main" val="1988163031"/>
+                    </a:ext>
+                  </a:extLst>
+                </a:gridCol>
+                <a:gridCol w="2469356">
+                  <a:extLst>
+                    <a:ext uri="{9D8B030D-6E8A-4147-A177-3AD203B41FA5}">
+                      <a16:colId xmlns:a16="http://schemas.microsoft.com/office/drawing/2014/main" val="3914734257"/>
+                    </a:ext>
+                  </a:extLst>
+                </a:gridCol>
+              </a:tblGrid>
+              <a:tr h="370840">
+                <a:tc gridSpan="2">
+                  <a:txBody>
+                    <a:bodyPr/>
+                    <a:lstStyle/>
+                    <a:p>
+                      <a:pPr algn="ctr"/>
+                      <a:r>
+                        <a:rPr lang="sk-SK" dirty="0" err="1"/>
+                        <a:t>Synthetic</a:t>
+                      </a:r>
+                      <a:endParaRPr lang="en-GB" dirty="0"/>
+                    </a:p>
+                  </a:txBody>
+                  <a:tcPr anchor="ctr"/>
+                </a:tc>
+                <a:tc hMerge="1">
+                  <a:txBody>
+                    <a:bodyPr/>
+                    <a:lstStyle/>
+                    <a:p>
+                      <a:endParaRPr lang="en-GB" dirty="0"/>
+                    </a:p>
+                  </a:txBody>
+                  <a:tcPr/>
+                </a:tc>
+                <a:extLst>
+                  <a:ext uri="{0D108BD9-81ED-4DB2-BD59-A6C34878D82A}">
+                    <a16:rowId xmlns:a16="http://schemas.microsoft.com/office/drawing/2014/main" val="2292982325"/>
+                  </a:ext>
+                </a:extLst>
+              </a:tr>
+              <a:tr h="370840">
+                <a:tc>
+                  <a:txBody>
+                    <a:bodyPr/>
+                    <a:lstStyle/>
+                    <a:p>
+                      <a:pPr algn="ctr"/>
+                      <a:r>
+                        <a:rPr lang="sk-SK" dirty="0"/>
+                        <a:t>At </a:t>
+                      </a:r>
+                      <a:r>
+                        <a:rPr lang="sk-SK" dirty="0" err="1"/>
+                        <a:t>least</a:t>
+                      </a:r>
+                      <a:r>
+                        <a:rPr lang="sk-SK" dirty="0"/>
+                        <a:t> </a:t>
+                      </a:r>
+                      <a:r>
+                        <a:rPr lang="sk-SK" dirty="0" err="1"/>
+                        <a:t>one</a:t>
+                      </a:r>
+                      <a:r>
+                        <a:rPr lang="sk-SK" dirty="0"/>
+                        <a:t> </a:t>
+                      </a:r>
+                      <a:r>
+                        <a:rPr lang="sk-SK" dirty="0" err="1"/>
+                        <a:t>correct</a:t>
+                      </a:r>
+                      <a:r>
+                        <a:rPr lang="sk-SK" dirty="0"/>
+                        <a:t> hit</a:t>
+                      </a:r>
+                      <a:endParaRPr lang="en-GB" dirty="0"/>
+                    </a:p>
+                  </a:txBody>
+                  <a:tcPr anchor="ctr"/>
+                </a:tc>
+                <a:tc>
+                  <a:txBody>
+                    <a:bodyPr/>
+                    <a:lstStyle/>
+                    <a:p>
+                      <a:pPr algn="ctr"/>
+                      <a:r>
+                        <a:rPr lang="sk-SK" dirty="0"/>
+                        <a:t>88</a:t>
+                      </a:r>
+                      <a:endParaRPr lang="en-GB" dirty="0"/>
+                    </a:p>
+                  </a:txBody>
+                  <a:tcPr anchor="ctr"/>
+                </a:tc>
+                <a:extLst>
+                  <a:ext uri="{0D108BD9-81ED-4DB2-BD59-A6C34878D82A}">
+                    <a16:rowId xmlns:a16="http://schemas.microsoft.com/office/drawing/2014/main" val="4042165234"/>
+                  </a:ext>
+                </a:extLst>
+              </a:tr>
+              <a:tr h="370840">
+                <a:tc>
+                  <a:txBody>
+                    <a:bodyPr/>
+                    <a:lstStyle/>
+                    <a:p>
+                      <a:pPr algn="ctr"/>
+                      <a:r>
+                        <a:rPr lang="sk-SK" dirty="0" err="1"/>
+                        <a:t>Only</a:t>
+                      </a:r>
+                      <a:r>
+                        <a:rPr lang="sk-SK" dirty="0"/>
+                        <a:t> </a:t>
+                      </a:r>
+                      <a:r>
+                        <a:rPr lang="sk-SK" dirty="0" err="1"/>
+                        <a:t>incorrect</a:t>
+                      </a:r>
+                      <a:r>
+                        <a:rPr lang="sk-SK" dirty="0"/>
+                        <a:t> </a:t>
+                      </a:r>
+                      <a:r>
+                        <a:rPr lang="sk-SK" dirty="0" err="1"/>
+                        <a:t>hits</a:t>
+                      </a:r>
+                      <a:endParaRPr lang="en-GB" dirty="0"/>
+                    </a:p>
+                  </a:txBody>
+                  <a:tcPr anchor="ctr"/>
+                </a:tc>
+                <a:tc>
+                  <a:txBody>
+                    <a:bodyPr/>
+                    <a:lstStyle/>
+                    <a:p>
+                      <a:pPr algn="ctr"/>
+                      <a:r>
+                        <a:rPr lang="sk-SK" dirty="0"/>
+                        <a:t>6</a:t>
+                      </a:r>
+                      <a:endParaRPr lang="en-GB" dirty="0"/>
+                    </a:p>
+                  </a:txBody>
+                  <a:tcPr anchor="ctr"/>
+                </a:tc>
+                <a:extLst>
+                  <a:ext uri="{0D108BD9-81ED-4DB2-BD59-A6C34878D82A}">
+                    <a16:rowId xmlns:a16="http://schemas.microsoft.com/office/drawing/2014/main" val="3338712773"/>
+                  </a:ext>
+                </a:extLst>
+              </a:tr>
+            </a:tbl>
+          </a:graphicData>
+        </a:graphic>
+      </p:graphicFrame>
+    </p:spTree>
+    <p:extLst>
+      <p:ext uri="{BB962C8B-B14F-4D97-AF65-F5344CB8AC3E}">
+        <p14:creationId xmlns:p14="http://schemas.microsoft.com/office/powerpoint/2010/main" val="2116699690"/>
+      </p:ext>
+    </p:extLst>
+  </p:cSld>
+  <p:clrMapOvr>
+    <a:masterClrMapping/>
+  </p:clrMapOvr>
+</p:sld>
+</file>
+
 <file path=ppt/slides/slide3.xml><?xml version="1.0" encoding="utf-8"?>
 <p:sld xmlns:a="http://schemas.openxmlformats.org/drawingml/2006/main" xmlns:r="http://schemas.openxmlformats.org/officeDocument/2006/relationships" xmlns:p="http://schemas.openxmlformats.org/presentationml/2006/main">
   <p:cSld>
@@ -9112,6 +9733,10 @@
           <a:bodyPr/>
           <a:lstStyle/>
           <a:p>
+            <a:r>
+              <a:rPr lang="sk-SK" dirty="0" err="1"/>
+              <a:t>introduction</a:t>
+            </a:r>
             <a:endParaRPr lang="en-GB" dirty="0"/>
           </a:p>
         </p:txBody>

</xml_diff>